<commit_message>
adding a power point file
</commit_message>
<xml_diff>
--- a/checkp-mongodb.pptx
+++ b/checkp-mongodb.pptx
@@ -5,21 +5,22 @@
     <p:sldMasterId id="2147483648" r:id="rId1"/>
   </p:sldMasterIdLst>
   <p:sldIdLst>
-    <p:sldId id="256" r:id="rId2"/>
-    <p:sldId id="257" r:id="rId3"/>
-    <p:sldId id="258" r:id="rId4"/>
-    <p:sldId id="259" r:id="rId5"/>
-    <p:sldId id="260" r:id="rId6"/>
-    <p:sldId id="261" r:id="rId7"/>
-    <p:sldId id="262" r:id="rId8"/>
-    <p:sldId id="263" r:id="rId9"/>
-    <p:sldId id="264" r:id="rId10"/>
-    <p:sldId id="265" r:id="rId11"/>
-    <p:sldId id="266" r:id="rId12"/>
-    <p:sldId id="267" r:id="rId13"/>
-    <p:sldId id="268" r:id="rId14"/>
-    <p:sldId id="269" r:id="rId15"/>
-    <p:sldId id="270" r:id="rId16"/>
+    <p:sldId id="271" r:id="rId2"/>
+    <p:sldId id="256" r:id="rId3"/>
+    <p:sldId id="257" r:id="rId4"/>
+    <p:sldId id="258" r:id="rId5"/>
+    <p:sldId id="259" r:id="rId6"/>
+    <p:sldId id="260" r:id="rId7"/>
+    <p:sldId id="261" r:id="rId8"/>
+    <p:sldId id="262" r:id="rId9"/>
+    <p:sldId id="263" r:id="rId10"/>
+    <p:sldId id="264" r:id="rId11"/>
+    <p:sldId id="265" r:id="rId12"/>
+    <p:sldId id="266" r:id="rId13"/>
+    <p:sldId id="267" r:id="rId14"/>
+    <p:sldId id="268" r:id="rId15"/>
+    <p:sldId id="269" r:id="rId16"/>
+    <p:sldId id="270" r:id="rId17"/>
   </p:sldIdLst>
   <p:sldSz cx="12192000" cy="6858000"/>
   <p:notesSz cx="6858000" cy="9144000"/>
@@ -118,6 +119,11 @@
       </a:defRPr>
     </a:lvl9pPr>
   </p:defaultTextStyle>
+  <p:extLst>
+    <p:ext uri="{EFAFB233-063F-42B5-8137-9DF3F51BA10A}">
+      <p15:sldGuideLst xmlns:p15="http://schemas.microsoft.com/office/powerpoint/2012/main"/>
+    </p:ext>
+  </p:extLst>
 </p:presentation>
 </file>
 
@@ -252,7 +258,7 @@
           <a:p>
             <a:fld id="{1ABBF98E-B9A2-4043-B4ED-D1D0401434C4}" type="datetimeFigureOut">
               <a:rPr lang="en-GB" smtClean="0"/>
-              <a:t>09/05/2023</a:t>
+              <a:t>10/05/2023</a:t>
             </a:fld>
             <a:endParaRPr lang="en-GB"/>
           </a:p>
@@ -422,7 +428,7 @@
           <a:p>
             <a:fld id="{1ABBF98E-B9A2-4043-B4ED-D1D0401434C4}" type="datetimeFigureOut">
               <a:rPr lang="en-GB" smtClean="0"/>
-              <a:t>09/05/2023</a:t>
+              <a:t>10/05/2023</a:t>
             </a:fld>
             <a:endParaRPr lang="en-GB"/>
           </a:p>
@@ -602,7 +608,7 @@
           <a:p>
             <a:fld id="{1ABBF98E-B9A2-4043-B4ED-D1D0401434C4}" type="datetimeFigureOut">
               <a:rPr lang="en-GB" smtClean="0"/>
-              <a:t>09/05/2023</a:t>
+              <a:t>10/05/2023</a:t>
             </a:fld>
             <a:endParaRPr lang="en-GB"/>
           </a:p>
@@ -772,7 +778,7 @@
           <a:p>
             <a:fld id="{1ABBF98E-B9A2-4043-B4ED-D1D0401434C4}" type="datetimeFigureOut">
               <a:rPr lang="en-GB" smtClean="0"/>
-              <a:t>09/05/2023</a:t>
+              <a:t>10/05/2023</a:t>
             </a:fld>
             <a:endParaRPr lang="en-GB"/>
           </a:p>
@@ -1018,7 +1024,7 @@
           <a:p>
             <a:fld id="{1ABBF98E-B9A2-4043-B4ED-D1D0401434C4}" type="datetimeFigureOut">
               <a:rPr lang="en-GB" smtClean="0"/>
-              <a:t>09/05/2023</a:t>
+              <a:t>10/05/2023</a:t>
             </a:fld>
             <a:endParaRPr lang="en-GB"/>
           </a:p>
@@ -1250,7 +1256,7 @@
           <a:p>
             <a:fld id="{1ABBF98E-B9A2-4043-B4ED-D1D0401434C4}" type="datetimeFigureOut">
               <a:rPr lang="en-GB" smtClean="0"/>
-              <a:t>09/05/2023</a:t>
+              <a:t>10/05/2023</a:t>
             </a:fld>
             <a:endParaRPr lang="en-GB"/>
           </a:p>
@@ -1617,7 +1623,7 @@
           <a:p>
             <a:fld id="{1ABBF98E-B9A2-4043-B4ED-D1D0401434C4}" type="datetimeFigureOut">
               <a:rPr lang="en-GB" smtClean="0"/>
-              <a:t>09/05/2023</a:t>
+              <a:t>10/05/2023</a:t>
             </a:fld>
             <a:endParaRPr lang="en-GB"/>
           </a:p>
@@ -1735,7 +1741,7 @@
           <a:p>
             <a:fld id="{1ABBF98E-B9A2-4043-B4ED-D1D0401434C4}" type="datetimeFigureOut">
               <a:rPr lang="en-GB" smtClean="0"/>
-              <a:t>09/05/2023</a:t>
+              <a:t>10/05/2023</a:t>
             </a:fld>
             <a:endParaRPr lang="en-GB"/>
           </a:p>
@@ -1830,7 +1836,7 @@
           <a:p>
             <a:fld id="{1ABBF98E-B9A2-4043-B4ED-D1D0401434C4}" type="datetimeFigureOut">
               <a:rPr lang="en-GB" smtClean="0"/>
-              <a:t>09/05/2023</a:t>
+              <a:t>10/05/2023</a:t>
             </a:fld>
             <a:endParaRPr lang="en-GB"/>
           </a:p>
@@ -2107,7 +2113,7 @@
           <a:p>
             <a:fld id="{1ABBF98E-B9A2-4043-B4ED-D1D0401434C4}" type="datetimeFigureOut">
               <a:rPr lang="en-GB" smtClean="0"/>
-              <a:t>09/05/2023</a:t>
+              <a:t>10/05/2023</a:t>
             </a:fld>
             <a:endParaRPr lang="en-GB"/>
           </a:p>
@@ -2360,7 +2366,7 @@
           <a:p>
             <a:fld id="{1ABBF98E-B9A2-4043-B4ED-D1D0401434C4}" type="datetimeFigureOut">
               <a:rPr lang="en-GB" smtClean="0"/>
-              <a:t>09/05/2023</a:t>
+              <a:t>10/05/2023</a:t>
             </a:fld>
             <a:endParaRPr lang="en-GB"/>
           </a:p>
@@ -2573,7 +2579,7 @@
           <a:p>
             <a:fld id="{1ABBF98E-B9A2-4043-B4ED-D1D0401434C4}" type="datetimeFigureOut">
               <a:rPr lang="en-GB" smtClean="0"/>
-              <a:t>09/05/2023</a:t>
+              <a:t>10/05/2023</a:t>
             </a:fld>
             <a:endParaRPr lang="en-GB"/>
           </a:p>
@@ -2985,7 +2991,7 @@
             <a:spLocks noGrp="1"/>
           </p:cNvSpPr>
           <p:nvPr>
-            <p:ph type="ctrTitle"/>
+            <p:ph type="title"/>
           </p:nvPr>
         </p:nvSpPr>
         <p:spPr/>
@@ -2993,18 +2999,30 @@
           <a:bodyPr/>
           <a:lstStyle/>
           <a:p>
-            <a:endParaRPr lang="en-GB"/>
-          </a:p>
-        </p:txBody>
-      </p:sp>
-      <p:sp>
-        <p:nvSpPr>
-          <p:cNvPr id="3" name="Subtitle 2"/>
-          <p:cNvSpPr>
-            <a:spLocks noGrp="1"/>
-          </p:cNvSpPr>
-          <p:nvPr>
-            <p:ph type="subTitle" idx="1"/>
+            <a:r>
+              <a:rPr lang="en-GB" dirty="0" err="1" smtClean="0"/>
+              <a:t>Thamer</a:t>
+            </a:r>
+            <a:r>
+              <a:rPr lang="en-GB" dirty="0" smtClean="0"/>
+              <a:t> </a:t>
+            </a:r>
+            <a:r>
+              <a:rPr lang="en-GB" dirty="0" err="1" smtClean="0"/>
+              <a:t>lefi</a:t>
+            </a:r>
+            <a:endParaRPr lang="en-GB" dirty="0"/>
+          </a:p>
+        </p:txBody>
+      </p:sp>
+      <p:sp>
+        <p:nvSpPr>
+          <p:cNvPr id="3" name="Content Placeholder 2"/>
+          <p:cNvSpPr>
+            <a:spLocks noGrp="1"/>
+          </p:cNvSpPr>
+          <p:nvPr>
+            <p:ph idx="1"/>
           </p:nvPr>
         </p:nvSpPr>
         <p:spPr/>
@@ -3012,17 +3030,61 @@
           <a:bodyPr/>
           <a:lstStyle/>
           <a:p>
-            <a:endParaRPr lang="en-GB"/>
-          </a:p>
-        </p:txBody>
-      </p:sp>
+            <a:r>
+              <a:rPr lang="en-GB" dirty="0" smtClean="0"/>
+              <a:t>Mongo </a:t>
+            </a:r>
+            <a:r>
+              <a:rPr lang="en-GB" dirty="0" err="1" smtClean="0"/>
+              <a:t>db</a:t>
+            </a:r>
+            <a:r>
+              <a:rPr lang="en-GB" dirty="0" smtClean="0"/>
+              <a:t> checkpoint</a:t>
+            </a:r>
+            <a:endParaRPr lang="en-GB" dirty="0"/>
+          </a:p>
+        </p:txBody>
+      </p:sp>
+    </p:spTree>
+    <p:extLst>
+      <p:ext uri="{BB962C8B-B14F-4D97-AF65-F5344CB8AC3E}">
+        <p14:creationId xmlns:p14="http://schemas.microsoft.com/office/powerpoint/2010/main" val="231903987"/>
+      </p:ext>
+    </p:extLst>
+  </p:cSld>
+  <p:clrMapOvr>
+    <a:masterClrMapping/>
+  </p:clrMapOvr>
+</p:sld>
+</file>
+
+<file path=ppt/slides/slide10.xml><?xml version="1.0" encoding="utf-8"?>
+<p:sld xmlns:a="http://schemas.openxmlformats.org/drawingml/2006/main" xmlns:r="http://schemas.openxmlformats.org/officeDocument/2006/relationships" xmlns:p="http://schemas.openxmlformats.org/presentationml/2006/main">
+  <p:cSld>
+    <p:spTree>
+      <p:nvGrpSpPr>
+        <p:cNvPr id="1" name=""/>
+        <p:cNvGrpSpPr/>
+        <p:nvPr/>
+      </p:nvGrpSpPr>
+      <p:grpSpPr>
+        <a:xfrm>
+          <a:off x="0" y="0"/>
+          <a:ext cx="0" cy="0"/>
+          <a:chOff x="0" y="0"/>
+          <a:chExt cx="0" cy="0"/>
+        </a:xfrm>
+      </p:grpSpPr>
       <p:pic>
         <p:nvPicPr>
-          <p:cNvPr id="4" name="Picture 3"/>
+          <p:cNvPr id="4" name="Content Placeholder 3"/>
           <p:cNvPicPr>
-            <a:picLocks noChangeAspect="1"/>
+            <a:picLocks noGrp="1" noChangeAspect="1"/>
           </p:cNvPicPr>
-          <p:nvPr/>
+          <p:nvPr>
+            <p:ph idx="1"/>
+          </p:nvPr>
         </p:nvPicPr>
         <p:blipFill>
           <a:blip r:embed="rId2">
@@ -3038,18 +3100,15 @@
         </p:blipFill>
         <p:spPr>
           <a:xfrm>
-            <a:off x="1428750" y="985837"/>
-            <a:ext cx="9334500" cy="4886325"/>
+            <a:off x="1815152" y="1064525"/>
+            <a:ext cx="8066512" cy="5112438"/>
           </a:xfrm>
-          <a:prstGeom prst="rect">
-            <a:avLst/>
-          </a:prstGeom>
         </p:spPr>
       </p:pic>
     </p:spTree>
     <p:extLst>
       <p:ext uri="{BB962C8B-B14F-4D97-AF65-F5344CB8AC3E}">
-        <p14:creationId xmlns:p14="http://schemas.microsoft.com/office/powerpoint/2010/main" val="77294369"/>
+        <p14:creationId xmlns:p14="http://schemas.microsoft.com/office/powerpoint/2010/main" val="3286931215"/>
       </p:ext>
     </p:extLst>
   </p:cSld>
@@ -3059,7 +3118,7 @@
 </p:sld>
 </file>
 
-<file path=ppt/slides/slide10.xml><?xml version="1.0" encoding="utf-8"?>
+<file path=ppt/slides/slide11.xml><?xml version="1.0" encoding="utf-8"?>
 <p:sld xmlns:a="http://schemas.openxmlformats.org/drawingml/2006/main" xmlns:r="http://schemas.openxmlformats.org/officeDocument/2006/relationships" xmlns:p="http://schemas.openxmlformats.org/presentationml/2006/main">
   <p:cSld>
     <p:spTree>
@@ -3118,7 +3177,7 @@
 </p:sld>
 </file>
 
-<file path=ppt/slides/slide11.xml><?xml version="1.0" encoding="utf-8"?>
+<file path=ppt/slides/slide12.xml><?xml version="1.0" encoding="utf-8"?>
 <p:sld xmlns:a="http://schemas.openxmlformats.org/drawingml/2006/main" xmlns:r="http://schemas.openxmlformats.org/officeDocument/2006/relationships" xmlns:p="http://schemas.openxmlformats.org/presentationml/2006/main">
   <p:cSld>
     <p:spTree>
@@ -3177,7 +3236,7 @@
 </p:sld>
 </file>
 
-<file path=ppt/slides/slide12.xml><?xml version="1.0" encoding="utf-8"?>
+<file path=ppt/slides/slide13.xml><?xml version="1.0" encoding="utf-8"?>
 <p:sld xmlns:a="http://schemas.openxmlformats.org/drawingml/2006/main" xmlns:r="http://schemas.openxmlformats.org/officeDocument/2006/relationships" xmlns:p="http://schemas.openxmlformats.org/presentationml/2006/main">
   <p:cSld>
     <p:spTree>
@@ -3236,7 +3295,7 @@
 </p:sld>
 </file>
 
-<file path=ppt/slides/slide13.xml><?xml version="1.0" encoding="utf-8"?>
+<file path=ppt/slides/slide14.xml><?xml version="1.0" encoding="utf-8"?>
 <p:sld xmlns:a="http://schemas.openxmlformats.org/drawingml/2006/main" xmlns:r="http://schemas.openxmlformats.org/officeDocument/2006/relationships" xmlns:p="http://schemas.openxmlformats.org/presentationml/2006/main">
   <p:cSld>
     <p:spTree>
@@ -3295,7 +3354,7 @@
 </p:sld>
 </file>
 
-<file path=ppt/slides/slide14.xml><?xml version="1.0" encoding="utf-8"?>
+<file path=ppt/slides/slide15.xml><?xml version="1.0" encoding="utf-8"?>
 <p:sld xmlns:a="http://schemas.openxmlformats.org/drawingml/2006/main" xmlns:r="http://schemas.openxmlformats.org/officeDocument/2006/relationships" xmlns:p="http://schemas.openxmlformats.org/presentationml/2006/main">
   <p:cSld>
     <p:spTree>
@@ -3354,7 +3413,7 @@
 </p:sld>
 </file>
 
-<file path=ppt/slides/slide15.xml><?xml version="1.0" encoding="utf-8"?>
+<file path=ppt/slides/slide16.xml><?xml version="1.0" encoding="utf-8"?>
 <p:sld xmlns:a="http://schemas.openxmlformats.org/drawingml/2006/main" xmlns:r="http://schemas.openxmlformats.org/officeDocument/2006/relationships" xmlns:p="http://schemas.openxmlformats.org/presentationml/2006/main">
   <p:cSld>
     <p:spTree>
@@ -3437,6 +3496,104 @@
             <a:spLocks noGrp="1"/>
           </p:cNvSpPr>
           <p:nvPr>
+            <p:ph type="ctrTitle"/>
+          </p:nvPr>
+        </p:nvSpPr>
+        <p:spPr/>
+        <p:txBody>
+          <a:bodyPr/>
+          <a:lstStyle/>
+          <a:p>
+            <a:endParaRPr lang="en-GB"/>
+          </a:p>
+        </p:txBody>
+      </p:sp>
+      <p:sp>
+        <p:nvSpPr>
+          <p:cNvPr id="3" name="Subtitle 2"/>
+          <p:cNvSpPr>
+            <a:spLocks noGrp="1"/>
+          </p:cNvSpPr>
+          <p:nvPr>
+            <p:ph type="subTitle" idx="1"/>
+          </p:nvPr>
+        </p:nvSpPr>
+        <p:spPr/>
+        <p:txBody>
+          <a:bodyPr/>
+          <a:lstStyle/>
+          <a:p>
+            <a:endParaRPr lang="en-GB"/>
+          </a:p>
+        </p:txBody>
+      </p:sp>
+      <p:pic>
+        <p:nvPicPr>
+          <p:cNvPr id="4" name="Picture 3"/>
+          <p:cNvPicPr>
+            <a:picLocks noChangeAspect="1"/>
+          </p:cNvPicPr>
+          <p:nvPr/>
+        </p:nvPicPr>
+        <p:blipFill>
+          <a:blip r:embed="rId2">
+            <a:extLst>
+              <a:ext uri="{28A0092B-C50C-407E-A947-70E740481C1C}">
+                <a14:useLocalDpi xmlns:a14="http://schemas.microsoft.com/office/drawing/2010/main" val="0"/>
+              </a:ext>
+            </a:extLst>
+          </a:blip>
+          <a:stretch>
+            <a:fillRect/>
+          </a:stretch>
+        </p:blipFill>
+        <p:spPr>
+          <a:xfrm>
+            <a:off x="1428750" y="985837"/>
+            <a:ext cx="9334500" cy="4886325"/>
+          </a:xfrm>
+          <a:prstGeom prst="rect">
+            <a:avLst/>
+          </a:prstGeom>
+        </p:spPr>
+      </p:pic>
+    </p:spTree>
+    <p:extLst>
+      <p:ext uri="{BB962C8B-B14F-4D97-AF65-F5344CB8AC3E}">
+        <p14:creationId xmlns:p14="http://schemas.microsoft.com/office/powerpoint/2010/main" val="77294369"/>
+      </p:ext>
+    </p:extLst>
+  </p:cSld>
+  <p:clrMapOvr>
+    <a:masterClrMapping/>
+  </p:clrMapOvr>
+</p:sld>
+</file>
+
+<file path=ppt/slides/slide3.xml><?xml version="1.0" encoding="utf-8"?>
+<p:sld xmlns:a="http://schemas.openxmlformats.org/drawingml/2006/main" xmlns:r="http://schemas.openxmlformats.org/officeDocument/2006/relationships" xmlns:p="http://schemas.openxmlformats.org/presentationml/2006/main">
+  <p:cSld>
+    <p:spTree>
+      <p:nvGrpSpPr>
+        <p:cNvPr id="1" name=""/>
+        <p:cNvGrpSpPr/>
+        <p:nvPr/>
+      </p:nvGrpSpPr>
+      <p:grpSpPr>
+        <a:xfrm>
+          <a:off x="0" y="0"/>
+          <a:ext cx="0" cy="0"/>
+          <a:chOff x="0" y="0"/>
+          <a:chExt cx="0" cy="0"/>
+        </a:xfrm>
+      </p:grpSpPr>
+      <p:sp>
+        <p:nvSpPr>
+          <p:cNvPr id="2" name="Title 1"/>
+          <p:cNvSpPr>
+            <a:spLocks noGrp="1"/>
+          </p:cNvSpPr>
+          <p:nvPr>
             <p:ph type="title"/>
           </p:nvPr>
         </p:nvSpPr>
@@ -3500,7 +3657,7 @@
 </p:sld>
 </file>
 
-<file path=ppt/slides/slide3.xml><?xml version="1.0" encoding="utf-8"?>
+<file path=ppt/slides/slide4.xml><?xml version="1.0" encoding="utf-8"?>
 <p:sld xmlns:a="http://schemas.openxmlformats.org/drawingml/2006/main" xmlns:r="http://schemas.openxmlformats.org/officeDocument/2006/relationships" xmlns:p="http://schemas.openxmlformats.org/presentationml/2006/main">
   <p:cSld>
     <p:spTree>
@@ -3559,7 +3716,7 @@
 </p:sld>
 </file>
 
-<file path=ppt/slides/slide4.xml><?xml version="1.0" encoding="utf-8"?>
+<file path=ppt/slides/slide5.xml><?xml version="1.0" encoding="utf-8"?>
 <p:sld xmlns:a="http://schemas.openxmlformats.org/drawingml/2006/main" xmlns:r="http://schemas.openxmlformats.org/officeDocument/2006/relationships" xmlns:p="http://schemas.openxmlformats.org/presentationml/2006/main">
   <p:cSld>
     <p:spTree>
@@ -3654,7 +3811,7 @@
 </p:sld>
 </file>
 
-<file path=ppt/slides/slide5.xml><?xml version="1.0" encoding="utf-8"?>
+<file path=ppt/slides/slide6.xml><?xml version="1.0" encoding="utf-8"?>
 <p:sld xmlns:a="http://schemas.openxmlformats.org/drawingml/2006/main" xmlns:r="http://schemas.openxmlformats.org/officeDocument/2006/relationships" xmlns:p="http://schemas.openxmlformats.org/presentationml/2006/main">
   <p:cSld>
     <p:spTree>
@@ -3713,7 +3870,7 @@
 </p:sld>
 </file>
 
-<file path=ppt/slides/slide6.xml><?xml version="1.0" encoding="utf-8"?>
+<file path=ppt/slides/slide7.xml><?xml version="1.0" encoding="utf-8"?>
 <p:sld xmlns:a="http://schemas.openxmlformats.org/drawingml/2006/main" xmlns:r="http://schemas.openxmlformats.org/officeDocument/2006/relationships" xmlns:p="http://schemas.openxmlformats.org/presentationml/2006/main">
   <p:cSld>
     <p:spTree>
@@ -3772,7 +3929,7 @@
 </p:sld>
 </file>
 
-<file path=ppt/slides/slide7.xml><?xml version="1.0" encoding="utf-8"?>
+<file path=ppt/slides/slide8.xml><?xml version="1.0" encoding="utf-8"?>
 <p:sld xmlns:a="http://schemas.openxmlformats.org/drawingml/2006/main" xmlns:r="http://schemas.openxmlformats.org/officeDocument/2006/relationships" xmlns:p="http://schemas.openxmlformats.org/presentationml/2006/main">
   <p:cSld>
     <p:spTree>
@@ -3831,7 +3988,7 @@
 </p:sld>
 </file>
 
-<file path=ppt/slides/slide8.xml><?xml version="1.0" encoding="utf-8"?>
+<file path=ppt/slides/slide9.xml><?xml version="1.0" encoding="utf-8"?>
 <p:sld xmlns:a="http://schemas.openxmlformats.org/drawingml/2006/main" xmlns:r="http://schemas.openxmlformats.org/officeDocument/2006/relationships" xmlns:p="http://schemas.openxmlformats.org/presentationml/2006/main">
   <p:cSld>
     <p:spTree>
@@ -3881,65 +4038,6 @@
     <p:extLst>
       <p:ext uri="{BB962C8B-B14F-4D97-AF65-F5344CB8AC3E}">
         <p14:creationId xmlns:p14="http://schemas.microsoft.com/office/powerpoint/2010/main" val="3771430471"/>
-      </p:ext>
-    </p:extLst>
-  </p:cSld>
-  <p:clrMapOvr>
-    <a:masterClrMapping/>
-  </p:clrMapOvr>
-</p:sld>
-</file>
-
-<file path=ppt/slides/slide9.xml><?xml version="1.0" encoding="utf-8"?>
-<p:sld xmlns:a="http://schemas.openxmlformats.org/drawingml/2006/main" xmlns:r="http://schemas.openxmlformats.org/officeDocument/2006/relationships" xmlns:p="http://schemas.openxmlformats.org/presentationml/2006/main">
-  <p:cSld>
-    <p:spTree>
-      <p:nvGrpSpPr>
-        <p:cNvPr id="1" name=""/>
-        <p:cNvGrpSpPr/>
-        <p:nvPr/>
-      </p:nvGrpSpPr>
-      <p:grpSpPr>
-        <a:xfrm>
-          <a:off x="0" y="0"/>
-          <a:ext cx="0" cy="0"/>
-          <a:chOff x="0" y="0"/>
-          <a:chExt cx="0" cy="0"/>
-        </a:xfrm>
-      </p:grpSpPr>
-      <p:pic>
-        <p:nvPicPr>
-          <p:cNvPr id="4" name="Content Placeholder 3"/>
-          <p:cNvPicPr>
-            <a:picLocks noGrp="1" noChangeAspect="1"/>
-          </p:cNvPicPr>
-          <p:nvPr>
-            <p:ph idx="1"/>
-          </p:nvPr>
-        </p:nvPicPr>
-        <p:blipFill>
-          <a:blip r:embed="rId2">
-            <a:extLst>
-              <a:ext uri="{28A0092B-C50C-407E-A947-70E740481C1C}">
-                <a14:useLocalDpi xmlns:a14="http://schemas.microsoft.com/office/drawing/2010/main" val="0"/>
-              </a:ext>
-            </a:extLst>
-          </a:blip>
-          <a:stretch>
-            <a:fillRect/>
-          </a:stretch>
-        </p:blipFill>
-        <p:spPr>
-          <a:xfrm>
-            <a:off x="1815152" y="1064525"/>
-            <a:ext cx="8066512" cy="5112438"/>
-          </a:xfrm>
-        </p:spPr>
-      </p:pic>
-    </p:spTree>
-    <p:extLst>
-      <p:ext uri="{BB962C8B-B14F-4D97-AF65-F5344CB8AC3E}">
-        <p14:creationId xmlns:p14="http://schemas.microsoft.com/office/powerpoint/2010/main" val="3286931215"/>
       </p:ext>
     </p:extLst>
   </p:cSld>

</xml_diff>